<commit_message>
added examples & exercise for session with mocking
</commit_message>
<xml_diff>
--- a/doc/unit-testing-prezentace.pptx
+++ b/doc/unit-testing-prezentace.pptx
@@ -11,6 +11,11 @@
     <p:sldId id="259" r:id="rId5"/>
     <p:sldId id="260" r:id="rId6"/>
     <p:sldId id="261" r:id="rId7"/>
+    <p:sldId id="262" r:id="rId8"/>
+    <p:sldId id="263" r:id="rId9"/>
+    <p:sldId id="264" r:id="rId10"/>
+    <p:sldId id="265" r:id="rId11"/>
+    <p:sldId id="266" r:id="rId12"/>
   </p:sldIdLst>
   <p:sldSz cx="12192000" cy="6858000"/>
   <p:notesSz cx="6858000" cy="9144000"/>
@@ -840,7 +845,7 @@
             <a:fld id="{B61BEF0D-F0BB-DE4B-95CE-6DB70DBA9567}" type="datetimeFigureOut">
               <a:rPr lang="en-US" dirty="0"/>
               <a:pPr/>
-              <a:t>4/29/2021</a:t>
+              <a:t>5/4/2021</a:t>
             </a:fld>
             <a:endParaRPr lang="en-US" dirty="0"/>
           </a:p>
@@ -1088,7 +1093,7 @@
             <a:fld id="{B61BEF0D-F0BB-DE4B-95CE-6DB70DBA9567}" type="datetimeFigureOut">
               <a:rPr lang="en-US" dirty="0"/>
               <a:pPr/>
-              <a:t>4/29/2021</a:t>
+              <a:t>5/4/2021</a:t>
             </a:fld>
             <a:endParaRPr lang="en-US" dirty="0"/>
           </a:p>
@@ -1399,7 +1404,7 @@
             <a:fld id="{B61BEF0D-F0BB-DE4B-95CE-6DB70DBA9567}" type="datetimeFigureOut">
               <a:rPr lang="en-US" dirty="0"/>
               <a:pPr/>
-              <a:t>4/29/2021</a:t>
+              <a:t>5/4/2021</a:t>
             </a:fld>
             <a:endParaRPr lang="en-US" dirty="0"/>
           </a:p>
@@ -1737,7 +1742,7 @@
             <a:fld id="{B61BEF0D-F0BB-DE4B-95CE-6DB70DBA9567}" type="datetimeFigureOut">
               <a:rPr lang="en-US" dirty="0"/>
               <a:pPr/>
-              <a:t>4/29/2021</a:t>
+              <a:t>5/4/2021</a:t>
             </a:fld>
             <a:endParaRPr lang="en-US" dirty="0"/>
           </a:p>
@@ -2048,7 +2053,7 @@
             <a:fld id="{B61BEF0D-F0BB-DE4B-95CE-6DB70DBA9567}" type="datetimeFigureOut">
               <a:rPr lang="en-US" dirty="0"/>
               <a:pPr/>
-              <a:t>4/29/2021</a:t>
+              <a:t>5/4/2021</a:t>
             </a:fld>
             <a:endParaRPr lang="en-US" dirty="0"/>
           </a:p>
@@ -2438,7 +2443,7 @@
             <a:fld id="{B61BEF0D-F0BB-DE4B-95CE-6DB70DBA9567}" type="datetimeFigureOut">
               <a:rPr lang="en-US" dirty="0"/>
               <a:pPr/>
-              <a:t>4/29/2021</a:t>
+              <a:t>5/4/2021</a:t>
             </a:fld>
             <a:endParaRPr lang="en-US" dirty="0"/>
           </a:p>
@@ -2604,7 +2609,7 @@
           <a:p>
             <a:fld id="{55C6B4A9-1611-4792-9094-5F34BCA07E0B}" type="datetimeFigureOut">
               <a:rPr lang="en-US" dirty="0"/>
-              <a:t>4/29/2021</a:t>
+              <a:t>5/4/2021</a:t>
             </a:fld>
             <a:endParaRPr lang="en-US" dirty="0"/>
           </a:p>
@@ -2780,7 +2785,7 @@
             <a:fld id="{B61BEF0D-F0BB-DE4B-95CE-6DB70DBA9567}" type="datetimeFigureOut">
               <a:rPr lang="en-US" dirty="0"/>
               <a:pPr/>
-              <a:t>4/29/2021</a:t>
+              <a:t>5/4/2021</a:t>
             </a:fld>
             <a:endParaRPr lang="en-US" dirty="0"/>
           </a:p>
@@ -2953,7 +2958,7 @@
             <a:fld id="{B61BEF0D-F0BB-DE4B-95CE-6DB70DBA9567}" type="datetimeFigureOut">
               <a:rPr lang="en-US" dirty="0"/>
               <a:pPr/>
-              <a:t>4/29/2021</a:t>
+              <a:t>5/4/2021</a:t>
             </a:fld>
             <a:endParaRPr lang="en-US" dirty="0"/>
           </a:p>
@@ -3197,7 +3202,7 @@
             <a:fld id="{B61BEF0D-F0BB-DE4B-95CE-6DB70DBA9567}" type="datetimeFigureOut">
               <a:rPr lang="en-US" dirty="0"/>
               <a:pPr/>
-              <a:t>4/29/2021</a:t>
+              <a:t>5/4/2021</a:t>
             </a:fld>
             <a:endParaRPr lang="en-US" dirty="0"/>
           </a:p>
@@ -3425,7 +3430,7 @@
           <a:p>
             <a:fld id="{EB712588-04B1-427B-82EE-E8DB90309F08}" type="datetimeFigureOut">
               <a:rPr lang="en-US" dirty="0"/>
-              <a:t>4/29/2021</a:t>
+              <a:t>5/4/2021</a:t>
             </a:fld>
             <a:endParaRPr lang="en-US" dirty="0"/>
           </a:p>
@@ -3795,7 +3800,7 @@
             <a:fld id="{B61BEF0D-F0BB-DE4B-95CE-6DB70DBA9567}" type="datetimeFigureOut">
               <a:rPr lang="en-US" dirty="0"/>
               <a:pPr/>
-              <a:t>4/29/2021</a:t>
+              <a:t>5/4/2021</a:t>
             </a:fld>
             <a:endParaRPr lang="en-US" dirty="0"/>
           </a:p>
@@ -3915,7 +3920,7 @@
             <a:fld id="{B61BEF0D-F0BB-DE4B-95CE-6DB70DBA9567}" type="datetimeFigureOut">
               <a:rPr lang="en-US" dirty="0"/>
               <a:pPr/>
-              <a:t>4/29/2021</a:t>
+              <a:t>5/4/2021</a:t>
             </a:fld>
             <a:endParaRPr lang="en-US" dirty="0"/>
           </a:p>
@@ -4007,7 +4012,7 @@
             <a:fld id="{B61BEF0D-F0BB-DE4B-95CE-6DB70DBA9567}" type="datetimeFigureOut">
               <a:rPr lang="en-US" dirty="0"/>
               <a:pPr/>
-              <a:t>4/29/2021</a:t>
+              <a:t>5/4/2021</a:t>
             </a:fld>
             <a:endParaRPr lang="en-US" dirty="0"/>
           </a:p>
@@ -4258,7 +4263,7 @@
           <a:p>
             <a:fld id="{42A54C80-263E-416B-A8E0-580EDEADCBDC}" type="datetimeFigureOut">
               <a:rPr lang="en-US" dirty="0"/>
-              <a:t>4/29/2021</a:t>
+              <a:t>5/4/2021</a:t>
             </a:fld>
             <a:endParaRPr lang="en-US" dirty="0"/>
           </a:p>
@@ -4517,7 +4522,7 @@
             <a:fld id="{B61BEF0D-F0BB-DE4B-95CE-6DB70DBA9567}" type="datetimeFigureOut">
               <a:rPr lang="en-US" dirty="0"/>
               <a:pPr/>
-              <a:t>4/29/2021</a:t>
+              <a:t>5/4/2021</a:t>
             </a:fld>
             <a:endParaRPr lang="en-US" dirty="0"/>
           </a:p>
@@ -5257,7 +5262,7 @@
             <a:fld id="{B61BEF0D-F0BB-DE4B-95CE-6DB70DBA9567}" type="datetimeFigureOut">
               <a:rPr lang="en-US" dirty="0"/>
               <a:pPr/>
-              <a:t>4/29/2021</a:t>
+              <a:t>5/4/2021</a:t>
             </a:fld>
             <a:endParaRPr lang="en-US" dirty="0"/>
           </a:p>
@@ -5841,6 +5846,247 @@
     <p:extLst>
       <p:ext uri="{BB962C8B-B14F-4D97-AF65-F5344CB8AC3E}">
         <p14:creationId xmlns:p14="http://schemas.microsoft.com/office/powerpoint/2010/main" val="38334753"/>
+      </p:ext>
+    </p:extLst>
+  </p:cSld>
+  <p:clrMapOvr>
+    <a:masterClrMapping/>
+  </p:clrMapOvr>
+</p:sld>
+</file>
+
+<file path=ppt/slides/slide10.xml><?xml version="1.0" encoding="utf-8"?>
+<p:sld xmlns:a="http://schemas.openxmlformats.org/drawingml/2006/main" xmlns:r="http://schemas.openxmlformats.org/officeDocument/2006/relationships" xmlns:p="http://schemas.openxmlformats.org/presentationml/2006/main">
+  <p:cSld>
+    <p:spTree>
+      <p:nvGrpSpPr>
+        <p:cNvPr id="1" name=""/>
+        <p:cNvGrpSpPr/>
+        <p:nvPr/>
+      </p:nvGrpSpPr>
+      <p:grpSpPr>
+        <a:xfrm>
+          <a:off x="0" y="0"/>
+          <a:ext cx="0" cy="0"/>
+          <a:chOff x="0" y="0"/>
+          <a:chExt cx="0" cy="0"/>
+        </a:xfrm>
+      </p:grpSpPr>
+      <p:sp>
+        <p:nvSpPr>
+          <p:cNvPr id="2" name="Title 1">
+            <a:extLst>
+              <a:ext uri="{FF2B5EF4-FFF2-40B4-BE49-F238E27FC236}">
+                <a16:creationId xmlns:a16="http://schemas.microsoft.com/office/drawing/2014/main" id="{E42C6A2E-9A62-40A5-9123-98A300569528}"/>
+              </a:ext>
+            </a:extLst>
+          </p:cNvPr>
+          <p:cNvSpPr>
+            <a:spLocks noGrp="1"/>
+          </p:cNvSpPr>
+          <p:nvPr>
+            <p:ph type="title"/>
+          </p:nvPr>
+        </p:nvSpPr>
+        <p:spPr/>
+        <p:txBody>
+          <a:bodyPr/>
+          <a:lstStyle/>
+          <a:p>
+            <a:r>
+              <a:rPr lang="cs-CZ" dirty="0"/>
+              <a:t>Zlatá pravidla mockování</a:t>
+            </a:r>
+            <a:endParaRPr lang="en-US" dirty="0"/>
+          </a:p>
+        </p:txBody>
+      </p:sp>
+      <p:sp>
+        <p:nvSpPr>
+          <p:cNvPr id="3" name="Content Placeholder 2">
+            <a:extLst>
+              <a:ext uri="{FF2B5EF4-FFF2-40B4-BE49-F238E27FC236}">
+                <a16:creationId xmlns:a16="http://schemas.microsoft.com/office/drawing/2014/main" id="{A19868BE-8987-4421-895A-F610564D258A}"/>
+              </a:ext>
+            </a:extLst>
+          </p:cNvPr>
+          <p:cNvSpPr>
+            <a:spLocks noGrp="1"/>
+          </p:cNvSpPr>
+          <p:nvPr>
+            <p:ph idx="1"/>
+          </p:nvPr>
+        </p:nvSpPr>
+        <p:spPr/>
+        <p:txBody>
+          <a:bodyPr/>
+          <a:lstStyle/>
+          <a:p>
+            <a:r>
+              <a:rPr lang="cs-CZ" dirty="0"/>
+              <a:t>méně &gt; více</a:t>
+            </a:r>
+          </a:p>
+          <a:p>
+            <a:endParaRPr lang="cs-CZ" dirty="0"/>
+          </a:p>
+          <a:p>
+            <a:r>
+              <a:rPr lang="cs-CZ" dirty="0"/>
+              <a:t>Nejdřív refaktoruj (produkční kód), aby se později lépe psaly testy</a:t>
+            </a:r>
+          </a:p>
+          <a:p>
+            <a:endParaRPr lang="cs-CZ" dirty="0"/>
+          </a:p>
+          <a:p>
+            <a:r>
+              <a:rPr lang="cs-CZ" dirty="0"/>
+              <a:t>vágní mockování (any(), anyOrNull()) je většinou ok</a:t>
+            </a:r>
+          </a:p>
+          <a:p>
+            <a:endParaRPr lang="cs-CZ" dirty="0"/>
+          </a:p>
+          <a:p>
+            <a:endParaRPr lang="en-US" dirty="0"/>
+          </a:p>
+        </p:txBody>
+      </p:sp>
+    </p:spTree>
+    <p:extLst>
+      <p:ext uri="{BB962C8B-B14F-4D97-AF65-F5344CB8AC3E}">
+        <p14:creationId xmlns:p14="http://schemas.microsoft.com/office/powerpoint/2010/main" val="2696357041"/>
+      </p:ext>
+    </p:extLst>
+  </p:cSld>
+  <p:clrMapOvr>
+    <a:masterClrMapping/>
+  </p:clrMapOvr>
+</p:sld>
+</file>
+
+<file path=ppt/slides/slide11.xml><?xml version="1.0" encoding="utf-8"?>
+<p:sld xmlns:a="http://schemas.openxmlformats.org/drawingml/2006/main" xmlns:r="http://schemas.openxmlformats.org/officeDocument/2006/relationships" xmlns:p="http://schemas.openxmlformats.org/presentationml/2006/main">
+  <p:cSld>
+    <p:spTree>
+      <p:nvGrpSpPr>
+        <p:cNvPr id="1" name=""/>
+        <p:cNvGrpSpPr/>
+        <p:nvPr/>
+      </p:nvGrpSpPr>
+      <p:grpSpPr>
+        <a:xfrm>
+          <a:off x="0" y="0"/>
+          <a:ext cx="0" cy="0"/>
+          <a:chOff x="0" y="0"/>
+          <a:chExt cx="0" cy="0"/>
+        </a:xfrm>
+      </p:grpSpPr>
+      <p:sp>
+        <p:nvSpPr>
+          <p:cNvPr id="2" name="Title 1">
+            <a:extLst>
+              <a:ext uri="{FF2B5EF4-FFF2-40B4-BE49-F238E27FC236}">
+                <a16:creationId xmlns:a16="http://schemas.microsoft.com/office/drawing/2014/main" id="{0D801947-6AD8-4A24-A5AD-A75B1158B7E7}"/>
+              </a:ext>
+            </a:extLst>
+          </p:cNvPr>
+          <p:cNvSpPr>
+            <a:spLocks noGrp="1"/>
+          </p:cNvSpPr>
+          <p:nvPr>
+            <p:ph type="title"/>
+          </p:nvPr>
+        </p:nvSpPr>
+        <p:spPr/>
+        <p:txBody>
+          <a:bodyPr/>
+          <a:lstStyle/>
+          <a:p>
+            <a:r>
+              <a:rPr lang="cs-CZ" dirty="0"/>
+              <a:t>Prakticky</a:t>
+            </a:r>
+            <a:endParaRPr lang="en-US" dirty="0"/>
+          </a:p>
+        </p:txBody>
+      </p:sp>
+      <p:sp>
+        <p:nvSpPr>
+          <p:cNvPr id="3" name="Content Placeholder 2">
+            <a:extLst>
+              <a:ext uri="{FF2B5EF4-FFF2-40B4-BE49-F238E27FC236}">
+                <a16:creationId xmlns:a16="http://schemas.microsoft.com/office/drawing/2014/main" id="{FB7E0702-9F20-42FD-BA25-803635BDD7EB}"/>
+              </a:ext>
+            </a:extLst>
+          </p:cNvPr>
+          <p:cNvSpPr>
+            <a:spLocks noGrp="1"/>
+          </p:cNvSpPr>
+          <p:nvPr>
+            <p:ph idx="1"/>
+          </p:nvPr>
+        </p:nvSpPr>
+        <p:spPr/>
+        <p:txBody>
+          <a:bodyPr/>
+          <a:lstStyle/>
+          <a:p>
+            <a:r>
+              <a:rPr lang="cs-CZ" dirty="0"/>
+              <a:t>Example 2</a:t>
+            </a:r>
+          </a:p>
+          <a:p>
+            <a:pPr lvl="1"/>
+            <a:r>
+              <a:rPr lang="cs-CZ" dirty="0"/>
+              <a:t>instanciace</a:t>
+            </a:r>
+          </a:p>
+          <a:p>
+            <a:pPr lvl="1"/>
+            <a:r>
+              <a:rPr lang="cs-CZ" dirty="0"/>
+              <a:t>jak mockovat</a:t>
+            </a:r>
+          </a:p>
+          <a:p>
+            <a:pPr lvl="1"/>
+            <a:r>
+              <a:rPr lang="cs-CZ" dirty="0"/>
+              <a:t>jak verifikovat</a:t>
+            </a:r>
+          </a:p>
+          <a:p>
+            <a:pPr lvl="1"/>
+            <a:r>
+              <a:rPr lang="cs-CZ" dirty="0"/>
+              <a:t>pomocné metody</a:t>
+            </a:r>
+          </a:p>
+          <a:p>
+            <a:pPr lvl="1"/>
+            <a:r>
+              <a:rPr lang="cs-CZ" dirty="0"/>
+              <a:t>argument captor</a:t>
+            </a:r>
+          </a:p>
+          <a:p>
+            <a:pPr lvl="1"/>
+            <a:r>
+              <a:rPr lang="cs-CZ" dirty="0"/>
+              <a:t>timeout</a:t>
+            </a:r>
+            <a:endParaRPr lang="en-US" dirty="0"/>
+          </a:p>
+        </p:txBody>
+      </p:sp>
+    </p:spTree>
+    <p:extLst>
+      <p:ext uri="{BB962C8B-B14F-4D97-AF65-F5344CB8AC3E}">
+        <p14:creationId xmlns:p14="http://schemas.microsoft.com/office/powerpoint/2010/main" val="24598432"/>
       </p:ext>
     </p:extLst>
   </p:cSld>
@@ -8269,6 +8515,390 @@
 </p:sld>
 </file>
 
+<file path=ppt/slides/slide7.xml><?xml version="1.0" encoding="utf-8"?>
+<p:sld xmlns:a="http://schemas.openxmlformats.org/drawingml/2006/main" xmlns:r="http://schemas.openxmlformats.org/officeDocument/2006/relationships" xmlns:p="http://schemas.openxmlformats.org/presentationml/2006/main">
+  <p:cSld>
+    <p:spTree>
+      <p:nvGrpSpPr>
+        <p:cNvPr id="1" name=""/>
+        <p:cNvGrpSpPr/>
+        <p:nvPr/>
+      </p:nvGrpSpPr>
+      <p:grpSpPr>
+        <a:xfrm>
+          <a:off x="0" y="0"/>
+          <a:ext cx="0" cy="0"/>
+          <a:chOff x="0" y="0"/>
+          <a:chExt cx="0" cy="0"/>
+        </a:xfrm>
+      </p:grpSpPr>
+      <p:sp>
+        <p:nvSpPr>
+          <p:cNvPr id="2" name="Title 1">
+            <a:extLst>
+              <a:ext uri="{FF2B5EF4-FFF2-40B4-BE49-F238E27FC236}">
+                <a16:creationId xmlns:a16="http://schemas.microsoft.com/office/drawing/2014/main" id="{0E594789-92C9-4C16-9CC3-8026C2CBF660}"/>
+              </a:ext>
+            </a:extLst>
+          </p:cNvPr>
+          <p:cNvSpPr>
+            <a:spLocks noGrp="1"/>
+          </p:cNvSpPr>
+          <p:nvPr>
+            <p:ph type="title"/>
+          </p:nvPr>
+        </p:nvSpPr>
+        <p:spPr/>
+        <p:txBody>
+          <a:bodyPr/>
+          <a:lstStyle/>
+          <a:p>
+            <a:r>
+              <a:rPr lang="cs-CZ" dirty="0"/>
+              <a:t>Mockování s Mockitem</a:t>
+            </a:r>
+            <a:endParaRPr lang="en-US" dirty="0"/>
+          </a:p>
+        </p:txBody>
+      </p:sp>
+      <p:sp>
+        <p:nvSpPr>
+          <p:cNvPr id="3" name="Content Placeholder 2">
+            <a:extLst>
+              <a:ext uri="{FF2B5EF4-FFF2-40B4-BE49-F238E27FC236}">
+                <a16:creationId xmlns:a16="http://schemas.microsoft.com/office/drawing/2014/main" id="{01A5B9AD-A301-4077-9146-15B79BED0870}"/>
+              </a:ext>
+            </a:extLst>
+          </p:cNvPr>
+          <p:cNvSpPr>
+            <a:spLocks noGrp="1"/>
+          </p:cNvSpPr>
+          <p:nvPr>
+            <p:ph idx="1"/>
+          </p:nvPr>
+        </p:nvSpPr>
+        <p:spPr>
+          <a:xfrm>
+            <a:off x="517943" y="1931989"/>
+            <a:ext cx="8596668" cy="3880773"/>
+          </a:xfrm>
+        </p:spPr>
+        <p:txBody>
+          <a:bodyPr/>
+          <a:lstStyle/>
+          <a:p>
+            <a:r>
+              <a:rPr lang="cs-CZ" dirty="0"/>
+              <a:t>Dependencies:</a:t>
+            </a:r>
+          </a:p>
+          <a:p>
+            <a:pPr lvl="1"/>
+            <a:r>
+              <a:rPr lang="cs-CZ" dirty="0"/>
+              <a:t>org.mockito:mockito-core - anotace, mockování (cílené na Javu)</a:t>
+            </a:r>
+          </a:p>
+          <a:p>
+            <a:pPr lvl="1"/>
+            <a:r>
+              <a:rPr lang="cs-CZ" dirty="0"/>
+              <a:t>org.mockito:mockito-junit-jupiter – MockitoExtension pro JUnit5</a:t>
+            </a:r>
+          </a:p>
+          <a:p>
+            <a:pPr lvl="1"/>
+            <a:r>
+              <a:rPr lang="cs-CZ" dirty="0"/>
+              <a:t>com.nhaarman.mockitokotlin2:mockito-kotlin – kotlin-friendly patch</a:t>
+            </a:r>
+          </a:p>
+          <a:p>
+            <a:pPr lvl="1"/>
+            <a:endParaRPr lang="cs-CZ" dirty="0"/>
+          </a:p>
+          <a:p>
+            <a:r>
+              <a:rPr lang="cs-CZ" dirty="0"/>
+              <a:t>test/resources/mockito-extensions/org.mockito.plugins.MockMaker</a:t>
+            </a:r>
+          </a:p>
+          <a:p>
+            <a:pPr lvl="1"/>
+            <a:r>
+              <a:rPr lang="cs-CZ" dirty="0"/>
+              <a:t>obsah souboru: „mock-maker-inline“</a:t>
+            </a:r>
+          </a:p>
+          <a:p>
+            <a:pPr lvl="1"/>
+            <a:r>
+              <a:rPr lang="cs-CZ" dirty="0"/>
+              <a:t>umožní mockitu mockovat final classy – což je pro kotlin v zásadě must-have</a:t>
+            </a:r>
+            <a:endParaRPr lang="en-US" dirty="0"/>
+          </a:p>
+        </p:txBody>
+      </p:sp>
+    </p:spTree>
+    <p:extLst>
+      <p:ext uri="{BB962C8B-B14F-4D97-AF65-F5344CB8AC3E}">
+        <p14:creationId xmlns:p14="http://schemas.microsoft.com/office/powerpoint/2010/main" val="1441827610"/>
+      </p:ext>
+    </p:extLst>
+  </p:cSld>
+  <p:clrMapOvr>
+    <a:masterClrMapping/>
+  </p:clrMapOvr>
+</p:sld>
+</file>
+
+<file path=ppt/slides/slide8.xml><?xml version="1.0" encoding="utf-8"?>
+<p:sld xmlns:a="http://schemas.openxmlformats.org/drawingml/2006/main" xmlns:r="http://schemas.openxmlformats.org/officeDocument/2006/relationships" xmlns:p="http://schemas.openxmlformats.org/presentationml/2006/main">
+  <p:cSld>
+    <p:spTree>
+      <p:nvGrpSpPr>
+        <p:cNvPr id="1" name=""/>
+        <p:cNvGrpSpPr/>
+        <p:nvPr/>
+      </p:nvGrpSpPr>
+      <p:grpSpPr>
+        <a:xfrm>
+          <a:off x="0" y="0"/>
+          <a:ext cx="0" cy="0"/>
+          <a:chOff x="0" y="0"/>
+          <a:chExt cx="0" cy="0"/>
+        </a:xfrm>
+      </p:grpSpPr>
+      <p:sp>
+        <p:nvSpPr>
+          <p:cNvPr id="2" name="Title 1">
+            <a:extLst>
+              <a:ext uri="{FF2B5EF4-FFF2-40B4-BE49-F238E27FC236}">
+                <a16:creationId xmlns:a16="http://schemas.microsoft.com/office/drawing/2014/main" id="{C3E1C135-9FCD-44C6-9696-45200EE6695F}"/>
+              </a:ext>
+            </a:extLst>
+          </p:cNvPr>
+          <p:cNvSpPr>
+            <a:spLocks noGrp="1"/>
+          </p:cNvSpPr>
+          <p:nvPr>
+            <p:ph type="title"/>
+          </p:nvPr>
+        </p:nvSpPr>
+        <p:spPr/>
+        <p:txBody>
+          <a:bodyPr/>
+          <a:lstStyle/>
+          <a:p>
+            <a:r>
+              <a:rPr lang="cs-CZ" dirty="0"/>
+              <a:t>Problémy s mockováním</a:t>
+            </a:r>
+            <a:endParaRPr lang="en-US" dirty="0"/>
+          </a:p>
+        </p:txBody>
+      </p:sp>
+      <p:sp>
+        <p:nvSpPr>
+          <p:cNvPr id="3" name="Content Placeholder 2">
+            <a:extLst>
+              <a:ext uri="{FF2B5EF4-FFF2-40B4-BE49-F238E27FC236}">
+                <a16:creationId xmlns:a16="http://schemas.microsoft.com/office/drawing/2014/main" id="{AB702620-3087-4E14-8352-A078893A5525}"/>
+              </a:ext>
+            </a:extLst>
+          </p:cNvPr>
+          <p:cNvSpPr>
+            <a:spLocks noGrp="1"/>
+          </p:cNvSpPr>
+          <p:nvPr>
+            <p:ph idx="1"/>
+          </p:nvPr>
+        </p:nvSpPr>
+        <p:spPr/>
+        <p:txBody>
+          <a:bodyPr/>
+          <a:lstStyle/>
+          <a:p>
+            <a:r>
+              <a:rPr lang="cs-CZ" dirty="0"/>
+              <a:t>úzké svázání s implementací mockované třídy</a:t>
+            </a:r>
+          </a:p>
+          <a:p>
+            <a:endParaRPr lang="cs-CZ" dirty="0"/>
+          </a:p>
+          <a:p>
+            <a:r>
+              <a:rPr lang="cs-CZ" dirty="0"/>
+              <a:t>technická syntaxe s hodně variantami</a:t>
+            </a:r>
+          </a:p>
+          <a:p>
+            <a:pPr lvl="1"/>
+            <a:endParaRPr lang="cs-CZ" dirty="0"/>
+          </a:p>
+          <a:p>
+            <a:r>
+              <a:rPr lang="cs-CZ" dirty="0"/>
+              <a:t>nižší vypovídající hodnota testu</a:t>
+            </a:r>
+          </a:p>
+          <a:p>
+            <a:pPr lvl="1"/>
+            <a:r>
+              <a:rPr lang="cs-CZ" dirty="0"/>
+              <a:t>výměnnou máme stabilnější a rychlejší testy</a:t>
+            </a:r>
+          </a:p>
+          <a:p>
+            <a:pPr lvl="1"/>
+            <a:endParaRPr lang="cs-CZ" dirty="0"/>
+          </a:p>
+          <a:p>
+            <a:r>
+              <a:rPr lang="cs-CZ" dirty="0"/>
+              <a:t>bobtnající setup testu</a:t>
+            </a:r>
+          </a:p>
+        </p:txBody>
+      </p:sp>
+    </p:spTree>
+    <p:extLst>
+      <p:ext uri="{BB962C8B-B14F-4D97-AF65-F5344CB8AC3E}">
+        <p14:creationId xmlns:p14="http://schemas.microsoft.com/office/powerpoint/2010/main" val="3251933250"/>
+      </p:ext>
+    </p:extLst>
+  </p:cSld>
+  <p:clrMapOvr>
+    <a:masterClrMapping/>
+  </p:clrMapOvr>
+</p:sld>
+</file>
+
+<file path=ppt/slides/slide9.xml><?xml version="1.0" encoding="utf-8"?>
+<p:sld xmlns:a="http://schemas.openxmlformats.org/drawingml/2006/main" xmlns:r="http://schemas.openxmlformats.org/officeDocument/2006/relationships" xmlns:p="http://schemas.openxmlformats.org/presentationml/2006/main">
+  <p:cSld>
+    <p:spTree>
+      <p:nvGrpSpPr>
+        <p:cNvPr id="1" name=""/>
+        <p:cNvGrpSpPr/>
+        <p:nvPr/>
+      </p:nvGrpSpPr>
+      <p:grpSpPr>
+        <a:xfrm>
+          <a:off x="0" y="0"/>
+          <a:ext cx="0" cy="0"/>
+          <a:chOff x="0" y="0"/>
+          <a:chExt cx="0" cy="0"/>
+        </a:xfrm>
+      </p:grpSpPr>
+      <p:sp>
+        <p:nvSpPr>
+          <p:cNvPr id="2" name="Title 1">
+            <a:extLst>
+              <a:ext uri="{FF2B5EF4-FFF2-40B4-BE49-F238E27FC236}">
+                <a16:creationId xmlns:a16="http://schemas.microsoft.com/office/drawing/2014/main" id="{ADDB10B8-3C02-42AD-8C2B-E51F5C359DB1}"/>
+              </a:ext>
+            </a:extLst>
+          </p:cNvPr>
+          <p:cNvSpPr>
+            <a:spLocks noGrp="1"/>
+          </p:cNvSpPr>
+          <p:nvPr>
+            <p:ph type="title"/>
+          </p:nvPr>
+        </p:nvSpPr>
+        <p:spPr/>
+        <p:txBody>
+          <a:bodyPr/>
+          <a:lstStyle/>
+          <a:p>
+            <a:r>
+              <a:rPr lang="cs-CZ" dirty="0"/>
+              <a:t>Jakou funkci byste raději testovali?</a:t>
+            </a:r>
+            <a:endParaRPr lang="en-US" dirty="0"/>
+          </a:p>
+        </p:txBody>
+      </p:sp>
+      <p:pic>
+        <p:nvPicPr>
+          <p:cNvPr id="7" name="Content Placeholder 6">
+            <a:extLst>
+              <a:ext uri="{FF2B5EF4-FFF2-40B4-BE49-F238E27FC236}">
+                <a16:creationId xmlns:a16="http://schemas.microsoft.com/office/drawing/2014/main" id="{8EF1A63E-AAAB-4735-8A47-A748FE70BF66}"/>
+              </a:ext>
+            </a:extLst>
+          </p:cNvPr>
+          <p:cNvPicPr>
+            <a:picLocks noGrp="1" noChangeAspect="1"/>
+          </p:cNvPicPr>
+          <p:nvPr>
+            <p:ph sz="half" idx="2"/>
+          </p:nvPr>
+        </p:nvPicPr>
+        <p:blipFill>
+          <a:blip r:embed="rId2"/>
+          <a:stretch>
+            <a:fillRect/>
+          </a:stretch>
+        </p:blipFill>
+        <p:spPr>
+          <a:xfrm>
+            <a:off x="676718" y="2876745"/>
+            <a:ext cx="4184650" cy="2092325"/>
+          </a:xfrm>
+          <a:prstGeom prst="rect">
+            <a:avLst/>
+          </a:prstGeom>
+        </p:spPr>
+      </p:pic>
+      <p:pic>
+        <p:nvPicPr>
+          <p:cNvPr id="8" name="Content Placeholder 7">
+            <a:extLst>
+              <a:ext uri="{FF2B5EF4-FFF2-40B4-BE49-F238E27FC236}">
+                <a16:creationId xmlns:a16="http://schemas.microsoft.com/office/drawing/2014/main" id="{4FF40E4A-F933-4C48-AF9C-437110BE77C1}"/>
+              </a:ext>
+            </a:extLst>
+          </p:cNvPr>
+          <p:cNvPicPr>
+            <a:picLocks noGrp="1" noChangeAspect="1"/>
+          </p:cNvPicPr>
+          <p:nvPr>
+            <p:ph sz="quarter" idx="4"/>
+          </p:nvPr>
+        </p:nvPicPr>
+        <p:blipFill>
+          <a:blip r:embed="rId3"/>
+          <a:stretch>
+            <a:fillRect/>
+          </a:stretch>
+        </p:blipFill>
+        <p:spPr>
+          <a:xfrm>
+            <a:off x="5087764" y="2824314"/>
+            <a:ext cx="4186237" cy="1832601"/>
+          </a:xfrm>
+          <a:prstGeom prst="rect">
+            <a:avLst/>
+          </a:prstGeom>
+        </p:spPr>
+      </p:pic>
+    </p:spTree>
+    <p:extLst>
+      <p:ext uri="{BB962C8B-B14F-4D97-AF65-F5344CB8AC3E}">
+        <p14:creationId xmlns:p14="http://schemas.microsoft.com/office/powerpoint/2010/main" val="2373248157"/>
+      </p:ext>
+    </p:extLst>
+  </p:cSld>
+  <p:clrMapOvr>
+    <a:masterClrMapping/>
+  </p:clrMapOvr>
+</p:sld>
+</file>
+
 <file path=ppt/theme/theme1.xml><?xml version="1.0" encoding="utf-8"?>
 <a:theme xmlns:a="http://schemas.openxmlformats.org/drawingml/2006/main" name="Facet">
   <a:themeElements>

</xml_diff>